<commit_message>
Better detection, final tweaks
</commit_message>
<xml_diff>
--- a/presentation/Live-Cell_Tracking_using_Phase_Stretch_Transform_050421.pptx
+++ b/presentation/Live-Cell_Tracking_using_Phase_Stretch_Transform_050421.pptx
@@ -5,7 +5,7 @@
     <p:sldMasterId id="2147483852" r:id="rId1"/>
   </p:sldMasterIdLst>
   <p:notesMasterIdLst>
-    <p:notesMasterId r:id="rId15"/>
+    <p:notesMasterId r:id="rId16"/>
   </p:notesMasterIdLst>
   <p:sldIdLst>
     <p:sldId id="256" r:id="rId2"/>
@@ -15,12 +15,13 @@
     <p:sldId id="262" r:id="rId6"/>
     <p:sldId id="263" r:id="rId7"/>
     <p:sldId id="267" r:id="rId8"/>
-    <p:sldId id="259" r:id="rId9"/>
-    <p:sldId id="268" r:id="rId10"/>
-    <p:sldId id="271" r:id="rId11"/>
-    <p:sldId id="269" r:id="rId12"/>
-    <p:sldId id="272" r:id="rId13"/>
-    <p:sldId id="261" r:id="rId14"/>
+    <p:sldId id="273" r:id="rId9"/>
+    <p:sldId id="259" r:id="rId10"/>
+    <p:sldId id="268" r:id="rId11"/>
+    <p:sldId id="271" r:id="rId12"/>
+    <p:sldId id="269" r:id="rId13"/>
+    <p:sldId id="272" r:id="rId14"/>
+    <p:sldId id="261" r:id="rId15"/>
   </p:sldIdLst>
   <p:sldSz cx="9144000" cy="6858000" type="screen4x3"/>
   <p:notesSz cx="6858000" cy="9144000"/>
@@ -221,7 +222,7 @@
             <a:fld id="{1CB90C3B-E2B3-4807-8DA7-450E2EC4A722}" type="datetimeFigureOut">
               <a:rPr lang="en-US" smtClean="0"/>
               <a:pPr/>
-              <a:t>5/4/2021</a:t>
+              <a:t>5/23/2021</a:t>
             </a:fld>
             <a:endParaRPr lang="en-US"/>
           </a:p>
@@ -644,13 +645,8 @@
           <a:p>
             <a:r>
               <a:rPr lang="en-US" dirty="0" smtClean="0"/>
-              <a:t>-P and q are two dimensional frequency </a:t>
-            </a:r>
-            <a:r>
-              <a:rPr lang="en-US" dirty="0" smtClean="0"/>
-              <a:t>variables and A is the phase image</a:t>
-            </a:r>
-            <a:endParaRPr lang="en-US" dirty="0" smtClean="0"/>
+              <a:t>-P and q are two dimensional frequency variables and A is the phase image</a:t>
+            </a:r>
           </a:p>
           <a:p>
             <a:r>
@@ -678,11 +674,7 @@
             </a:r>
             <a:r>
               <a:rPr lang="en-US" baseline="0" dirty="0" smtClean="0"/>
-              <a:t> r</a:t>
-            </a:r>
-            <a:r>
-              <a:rPr lang="en-US" baseline="0" dirty="0" smtClean="0"/>
-              <a:t>= </a:t>
+              <a:t> r= </a:t>
             </a:r>
             <a:r>
               <a:rPr lang="en-US" baseline="0" dirty="0" err="1" smtClean="0"/>
@@ -698,11 +690,7 @@
             </a:r>
             <a:r>
               <a:rPr lang="en-US" baseline="0" dirty="0" smtClean="0"/>
-              <a:t>(q/p</a:t>
-            </a:r>
-            <a:r>
-              <a:rPr lang="en-US" baseline="0" dirty="0" smtClean="0"/>
-              <a:t>). S and W are parameters to be designed w	</a:t>
+              <a:t>(q/p). S and W are parameters to be designed w	</a:t>
             </a:r>
             <a:endParaRPr lang="en-US" dirty="0" smtClean="0"/>
           </a:p>
@@ -877,33 +865,24 @@
           <a:lstStyle/>
           <a:p>
             <a:r>
-              <a:rPr lang="en-US" dirty="0" smtClean="0"/>
-              <a:t>-P and q are two dimensional frequency variables</a:t>
-            </a:r>
-          </a:p>
-          <a:p>
+              <a:rPr lang="en-US" baseline="0" dirty="0" smtClean="0"/>
+              <a:t>E[x] here is the brightness </a:t>
+            </a:r>
+          </a:p>
+          <a:p>
+            <a:endParaRPr lang="en-US" baseline="0" dirty="0" smtClean="0"/>
+          </a:p>
+          <a:p>
+            <a:r>
+              <a:rPr lang="en-US" baseline="0" dirty="0" smtClean="0"/>
+              <a:t>PST is a reconfigurable operator that can be tuned to detect certain features</a:t>
+            </a:r>
+            <a:r>
+              <a:rPr lang="en-US" baseline="0" dirty="0" smtClean="0"/>
+              <a:t>	</a:t>
+            </a:r>
             <a:endParaRPr lang="en-US" dirty="0" smtClean="0"/>
           </a:p>
-          <a:p>
-            <a:r>
-              <a:rPr lang="en-US" dirty="0" smtClean="0"/>
-              <a:t>-The function</a:t>
-            </a:r>
-            <a:r>
-              <a:rPr lang="en-US" baseline="0" dirty="0" smtClean="0"/>
-              <a:t> L is the frequency response of the localization kernel and K is the frequency dependent phase</a:t>
-            </a:r>
-          </a:p>
-          <a:p>
-            <a:endParaRPr lang="en-US" baseline="0" dirty="0" smtClean="0"/>
-          </a:p>
-          <a:p>
-            <a:r>
-              <a:rPr lang="en-US" baseline="0" dirty="0" smtClean="0"/>
-              <a:t>-</a:t>
-            </a:r>
-            <a:endParaRPr lang="en-US" dirty="0"/>
-          </a:p>
         </p:txBody>
       </p:sp>
       <p:sp>
@@ -924,13 +903,18 @@
             <a:fld id="{AE4BCEA0-5B06-456F-A1A3-51F35B1847FD}" type="slidenum">
               <a:rPr lang="en-US" smtClean="0"/>
               <a:pPr/>
-              <a:t>9</a:t>
+              <a:t>8</a:t>
             </a:fld>
             <a:endParaRPr lang="en-US"/>
           </a:p>
         </p:txBody>
       </p:sp>
     </p:spTree>
+    <p:extLst>
+      <p:ext uri="{BB962C8B-B14F-4D97-AF65-F5344CB8AC3E}">
+        <p14:creationId xmlns:p14="http://schemas.microsoft.com/office/powerpoint/2010/main" val="1941351796"/>
+      </p:ext>
+    </p:extLst>
   </p:cSld>
   <p:clrMapOvr>
     <a:masterClrMapping/>
@@ -1032,7 +1016,115 @@
             <a:fld id="{AE4BCEA0-5B06-456F-A1A3-51F35B1847FD}" type="slidenum">
               <a:rPr lang="en-US" smtClean="0"/>
               <a:pPr/>
-              <a:t>11</a:t>
+              <a:t>10</a:t>
+            </a:fld>
+            <a:endParaRPr lang="en-US"/>
+          </a:p>
+        </p:txBody>
+      </p:sp>
+    </p:spTree>
+  </p:cSld>
+  <p:clrMapOvr>
+    <a:masterClrMapping/>
+  </p:clrMapOvr>
+</p:notes>
+</file>
+
+<file path=ppt/notesSlides/notesSlide6.xml><?xml version="1.0" encoding="utf-8"?>
+<p:notes xmlns:a="http://schemas.openxmlformats.org/drawingml/2006/main" xmlns:r="http://schemas.openxmlformats.org/officeDocument/2006/relationships" xmlns:p="http://schemas.openxmlformats.org/presentationml/2006/main">
+  <p:cSld>
+    <p:spTree>
+      <p:nvGrpSpPr>
+        <p:cNvPr id="1" name=""/>
+        <p:cNvGrpSpPr/>
+        <p:nvPr/>
+      </p:nvGrpSpPr>
+      <p:grpSpPr>
+        <a:xfrm>
+          <a:off x="0" y="0"/>
+          <a:ext cx="0" cy="0"/>
+          <a:chOff x="0" y="0"/>
+          <a:chExt cx="0" cy="0"/>
+        </a:xfrm>
+      </p:grpSpPr>
+      <p:sp>
+        <p:nvSpPr>
+          <p:cNvPr id="2" name="Slide Image Placeholder 1"/>
+          <p:cNvSpPr>
+            <a:spLocks noGrp="1" noRot="1" noChangeAspect="1"/>
+          </p:cNvSpPr>
+          <p:nvPr>
+            <p:ph type="sldImg"/>
+          </p:nvPr>
+        </p:nvSpPr>
+        <p:spPr/>
+      </p:sp>
+      <p:sp>
+        <p:nvSpPr>
+          <p:cNvPr id="3" name="Notes Placeholder 2"/>
+          <p:cNvSpPr>
+            <a:spLocks noGrp="1"/>
+          </p:cNvSpPr>
+          <p:nvPr>
+            <p:ph type="body" idx="1"/>
+          </p:nvPr>
+        </p:nvSpPr>
+        <p:spPr/>
+        <p:txBody>
+          <a:bodyPr>
+            <a:normAutofit/>
+          </a:bodyPr>
+          <a:lstStyle/>
+          <a:p>
+            <a:r>
+              <a:rPr lang="en-US" dirty="0" smtClean="0"/>
+              <a:t>-P and q are two dimensional frequency variables</a:t>
+            </a:r>
+          </a:p>
+          <a:p>
+            <a:endParaRPr lang="en-US" dirty="0" smtClean="0"/>
+          </a:p>
+          <a:p>
+            <a:r>
+              <a:rPr lang="en-US" dirty="0" smtClean="0"/>
+              <a:t>-The function</a:t>
+            </a:r>
+            <a:r>
+              <a:rPr lang="en-US" baseline="0" dirty="0" smtClean="0"/>
+              <a:t> L is the frequency response of the localization kernel and K is the frequency dependent phase</a:t>
+            </a:r>
+          </a:p>
+          <a:p>
+            <a:endParaRPr lang="en-US" baseline="0" dirty="0" smtClean="0"/>
+          </a:p>
+          <a:p>
+            <a:r>
+              <a:rPr lang="en-US" baseline="0" dirty="0" smtClean="0"/>
+              <a:t>-</a:t>
+            </a:r>
+            <a:endParaRPr lang="en-US" dirty="0"/>
+          </a:p>
+        </p:txBody>
+      </p:sp>
+      <p:sp>
+        <p:nvSpPr>
+          <p:cNvPr id="4" name="Slide Number Placeholder 3"/>
+          <p:cNvSpPr>
+            <a:spLocks noGrp="1"/>
+          </p:cNvSpPr>
+          <p:nvPr>
+            <p:ph type="sldNum" sz="quarter" idx="10"/>
+          </p:nvPr>
+        </p:nvSpPr>
+        <p:spPr/>
+        <p:txBody>
+          <a:bodyPr/>
+          <a:lstStyle/>
+          <a:p>
+            <a:fld id="{AE4BCEA0-5B06-456F-A1A3-51F35B1847FD}" type="slidenum">
+              <a:rPr lang="en-US" smtClean="0"/>
+              <a:pPr/>
+              <a:t>12</a:t>
             </a:fld>
             <a:endParaRPr lang="en-US"/>
           </a:p>
@@ -1233,7 +1325,7 @@
             <a:fld id="{4B75CBCE-7F37-4CB0-BB38-C9D8195C6C97}" type="datetimeFigureOut">
               <a:rPr lang="en-US" smtClean="0"/>
               <a:pPr/>
-              <a:t>5/4/2021</a:t>
+              <a:t>5/23/2021</a:t>
             </a:fld>
             <a:endParaRPr lang="en-US"/>
           </a:p>
@@ -1400,7 +1492,7 @@
             <a:fld id="{4B75CBCE-7F37-4CB0-BB38-C9D8195C6C97}" type="datetimeFigureOut">
               <a:rPr lang="en-US" smtClean="0"/>
               <a:pPr/>
-              <a:t>5/4/2021</a:t>
+              <a:t>5/23/2021</a:t>
             </a:fld>
             <a:endParaRPr lang="en-US"/>
           </a:p>
@@ -1577,7 +1669,7 @@
             <a:fld id="{4B75CBCE-7F37-4CB0-BB38-C9D8195C6C97}" type="datetimeFigureOut">
               <a:rPr lang="en-US" smtClean="0"/>
               <a:pPr/>
-              <a:t>5/4/2021</a:t>
+              <a:t>5/23/2021</a:t>
             </a:fld>
             <a:endParaRPr lang="en-US"/>
           </a:p>
@@ -1744,7 +1836,7 @@
             <a:fld id="{4B75CBCE-7F37-4CB0-BB38-C9D8195C6C97}" type="datetimeFigureOut">
               <a:rPr lang="en-US" smtClean="0"/>
               <a:pPr/>
-              <a:t>5/4/2021</a:t>
+              <a:t>5/23/2021</a:t>
             </a:fld>
             <a:endParaRPr lang="en-US"/>
           </a:p>
@@ -1987,7 +2079,7 @@
             <a:fld id="{4B75CBCE-7F37-4CB0-BB38-C9D8195C6C97}" type="datetimeFigureOut">
               <a:rPr lang="en-US" smtClean="0"/>
               <a:pPr/>
-              <a:t>5/4/2021</a:t>
+              <a:t>5/23/2021</a:t>
             </a:fld>
             <a:endParaRPr lang="en-US"/>
           </a:p>
@@ -2272,7 +2364,7 @@
             <a:fld id="{4B75CBCE-7F37-4CB0-BB38-C9D8195C6C97}" type="datetimeFigureOut">
               <a:rPr lang="en-US" smtClean="0"/>
               <a:pPr/>
-              <a:t>5/4/2021</a:t>
+              <a:t>5/23/2021</a:t>
             </a:fld>
             <a:endParaRPr lang="en-US"/>
           </a:p>
@@ -2691,7 +2783,7 @@
             <a:fld id="{4B75CBCE-7F37-4CB0-BB38-C9D8195C6C97}" type="datetimeFigureOut">
               <a:rPr lang="en-US" smtClean="0"/>
               <a:pPr/>
-              <a:t>5/4/2021</a:t>
+              <a:t>5/23/2021</a:t>
             </a:fld>
             <a:endParaRPr lang="en-US"/>
           </a:p>
@@ -2806,7 +2898,7 @@
             <a:fld id="{4B75CBCE-7F37-4CB0-BB38-C9D8195C6C97}" type="datetimeFigureOut">
               <a:rPr lang="en-US" smtClean="0"/>
               <a:pPr/>
-              <a:t>5/4/2021</a:t>
+              <a:t>5/23/2021</a:t>
             </a:fld>
             <a:endParaRPr lang="en-US"/>
           </a:p>
@@ -2898,7 +2990,7 @@
             <a:fld id="{4B75CBCE-7F37-4CB0-BB38-C9D8195C6C97}" type="datetimeFigureOut">
               <a:rPr lang="en-US" smtClean="0"/>
               <a:pPr/>
-              <a:t>5/4/2021</a:t>
+              <a:t>5/23/2021</a:t>
             </a:fld>
             <a:endParaRPr lang="en-US"/>
           </a:p>
@@ -3172,7 +3264,7 @@
             <a:fld id="{4B75CBCE-7F37-4CB0-BB38-C9D8195C6C97}" type="datetimeFigureOut">
               <a:rPr lang="en-US" smtClean="0"/>
               <a:pPr/>
-              <a:t>5/4/2021</a:t>
+              <a:t>5/23/2021</a:t>
             </a:fld>
             <a:endParaRPr lang="en-US"/>
           </a:p>
@@ -3422,7 +3514,7 @@
             <a:fld id="{4B75CBCE-7F37-4CB0-BB38-C9D8195C6C97}" type="datetimeFigureOut">
               <a:rPr lang="en-US" smtClean="0"/>
               <a:pPr/>
-              <a:t>5/4/2021</a:t>
+              <a:t>5/23/2021</a:t>
             </a:fld>
             <a:endParaRPr lang="en-US"/>
           </a:p>
@@ -3632,7 +3724,7 @@
             <a:fld id="{4B75CBCE-7F37-4CB0-BB38-C9D8195C6C97}" type="datetimeFigureOut">
               <a:rPr lang="en-US" smtClean="0"/>
               <a:pPr/>
-              <a:t>5/4/2021</a:t>
+              <a:t>5/23/2021</a:t>
             </a:fld>
             <a:endParaRPr lang="en-US"/>
           </a:p>
@@ -4106,6 +4198,181 @@
         <p:spPr>
           <a:xfrm>
             <a:off x="457200" y="274638"/>
+            <a:ext cx="8229600" cy="487362"/>
+          </a:xfrm>
+        </p:spPr>
+        <p:txBody>
+          <a:bodyPr>
+            <a:normAutofit fontScale="90000"/>
+          </a:bodyPr>
+          <a:lstStyle/>
+          <a:p>
+            <a:r>
+              <a:rPr lang="en-US" sz="3200" dirty="0" smtClean="0"/>
+              <a:t>Effect of PST on Original Image</a:t>
+            </a:r>
+            <a:endParaRPr lang="en-US" sz="3200" dirty="0"/>
+          </a:p>
+        </p:txBody>
+      </p:sp>
+      <p:sp>
+        <p:nvSpPr>
+          <p:cNvPr id="3" name="Content Placeholder 2"/>
+          <p:cNvSpPr>
+            <a:spLocks noGrp="1"/>
+          </p:cNvSpPr>
+          <p:nvPr>
+            <p:ph idx="1"/>
+          </p:nvPr>
+        </p:nvSpPr>
+        <p:spPr>
+          <a:xfrm>
+            <a:off x="457200" y="990600"/>
+            <a:ext cx="8229600" cy="5135563"/>
+          </a:xfrm>
+        </p:spPr>
+        <p:txBody>
+          <a:bodyPr>
+            <a:normAutofit/>
+          </a:bodyPr>
+          <a:lstStyle/>
+          <a:p>
+            <a:r>
+              <a:rPr lang="en-US" sz="2000" dirty="0" smtClean="0"/>
+              <a:t>Below is a single frame of the data set</a:t>
+            </a:r>
+            <a:endParaRPr lang="en-US" sz="2000" dirty="0"/>
+          </a:p>
+          <a:p>
+            <a:r>
+              <a:rPr lang="en-US" sz="2000" dirty="0" smtClean="0"/>
+              <a:t>To improve the image post PST, we up the contrast of the original image before passing it through the PST</a:t>
+            </a:r>
+          </a:p>
+        </p:txBody>
+      </p:sp>
+      <p:sp>
+        <p:nvSpPr>
+          <p:cNvPr id="5" name="Rectangle 4"/>
+          <p:cNvSpPr/>
+          <p:nvPr/>
+        </p:nvSpPr>
+        <p:spPr>
+          <a:xfrm>
+            <a:off x="152400" y="6324600"/>
+            <a:ext cx="8839200" cy="369332"/>
+          </a:xfrm>
+          <a:prstGeom prst="rect">
+            <a:avLst/>
+          </a:prstGeom>
+        </p:spPr>
+        <p:txBody>
+          <a:bodyPr wrap="square">
+            <a:spAutoFit/>
+          </a:bodyPr>
+          <a:lstStyle/>
+          <a:p>
+            <a:endParaRPr lang="en-US" dirty="0" smtClean="0">
+              <a:solidFill>
+                <a:srgbClr val="FF0000"/>
+              </a:solidFill>
+            </a:endParaRPr>
+          </a:p>
+        </p:txBody>
+      </p:sp>
+      <p:pic>
+        <p:nvPicPr>
+          <p:cNvPr id="4" name="Picture 3"/>
+          <p:cNvPicPr>
+            <a:picLocks noChangeAspect="1"/>
+          </p:cNvPicPr>
+          <p:nvPr/>
+        </p:nvPicPr>
+        <p:blipFill>
+          <a:blip r:embed="rId3"/>
+          <a:stretch>
+            <a:fillRect/>
+          </a:stretch>
+        </p:blipFill>
+        <p:spPr>
+          <a:xfrm>
+            <a:off x="76200" y="2209800"/>
+            <a:ext cx="4620690" cy="3916363"/>
+          </a:xfrm>
+          <a:prstGeom prst="rect">
+            <a:avLst/>
+          </a:prstGeom>
+        </p:spPr>
+      </p:pic>
+      <p:pic>
+        <p:nvPicPr>
+          <p:cNvPr id="6" name="Picture 5"/>
+          <p:cNvPicPr>
+            <a:picLocks noChangeAspect="1"/>
+          </p:cNvPicPr>
+          <p:nvPr/>
+        </p:nvPicPr>
+        <p:blipFill>
+          <a:blip r:embed="rId4"/>
+          <a:stretch>
+            <a:fillRect/>
+          </a:stretch>
+        </p:blipFill>
+        <p:spPr>
+          <a:xfrm>
+            <a:off x="4495800" y="2209800"/>
+            <a:ext cx="4359898" cy="3810001"/>
+          </a:xfrm>
+          <a:prstGeom prst="rect">
+            <a:avLst/>
+          </a:prstGeom>
+        </p:spPr>
+      </p:pic>
+    </p:spTree>
+  </p:cSld>
+  <p:clrMapOvr>
+    <a:masterClrMapping/>
+  </p:clrMapOvr>
+  <p:timing>
+    <p:tnLst>
+      <p:par>
+        <p:cTn id="1" dur="indefinite" restart="never" nodeType="tmRoot"/>
+      </p:par>
+    </p:tnLst>
+  </p:timing>
+</p:sld>
+</file>
+
+<file path=ppt/slides/slide11.xml><?xml version="1.0" encoding="utf-8"?>
+<p:sld xmlns:a="http://schemas.openxmlformats.org/drawingml/2006/main" xmlns:r="http://schemas.openxmlformats.org/officeDocument/2006/relationships" xmlns:p="http://schemas.openxmlformats.org/presentationml/2006/main">
+  <p:cSld>
+    <p:spTree>
+      <p:nvGrpSpPr>
+        <p:cNvPr id="1" name=""/>
+        <p:cNvGrpSpPr/>
+        <p:nvPr/>
+      </p:nvGrpSpPr>
+      <p:grpSpPr>
+        <a:xfrm>
+          <a:off x="0" y="0"/>
+          <a:ext cx="0" cy="0"/>
+          <a:chOff x="0" y="0"/>
+          <a:chExt cx="0" cy="0"/>
+        </a:xfrm>
+      </p:grpSpPr>
+      <p:sp>
+        <p:nvSpPr>
+          <p:cNvPr id="2" name="Title 1"/>
+          <p:cNvSpPr>
+            <a:spLocks noGrp="1"/>
+          </p:cNvSpPr>
+          <p:nvPr>
+            <p:ph type="title"/>
+          </p:nvPr>
+        </p:nvSpPr>
+        <p:spPr>
+          <a:xfrm>
+            <a:off x="457200" y="274638"/>
             <a:ext cx="8229600" cy="715962"/>
           </a:xfrm>
         </p:spPr>
@@ -4117,11 +4384,7 @@
           <a:p>
             <a:r>
               <a:rPr lang="en-US" sz="3200" dirty="0" smtClean="0"/>
-              <a:t>Overlaying PST Output on Origina</a:t>
-            </a:r>
-            <a:r>
-              <a:rPr lang="en-US" sz="3200" dirty="0" smtClean="0"/>
-              <a:t>l Image</a:t>
+              <a:t>Overlaying PST Output on Original Image</a:t>
             </a:r>
             <a:endParaRPr lang="en-US" sz="3200" dirty="0"/>
           </a:p>
@@ -4172,7 +4435,7 @@
         </p:blipFill>
         <p:spPr>
           <a:xfrm>
-            <a:off x="2476500" y="1752600"/>
+            <a:off x="2476500" y="1747510"/>
             <a:ext cx="4191000" cy="3697941"/>
           </a:xfrm>
           <a:prstGeom prst="rect">
@@ -4200,7 +4463,7 @@
 </p:sld>
 </file>
 
-<file path=ppt/slides/slide11.xml><?xml version="1.0" encoding="utf-8"?>
+<file path=ppt/slides/slide12.xml><?xml version="1.0" encoding="utf-8"?>
 <p:sld xmlns:a="http://schemas.openxmlformats.org/drawingml/2006/main" xmlns:r="http://schemas.openxmlformats.org/officeDocument/2006/relationships" xmlns:p="http://schemas.openxmlformats.org/presentationml/2006/main">
   <p:cSld>
     <p:spTree>
@@ -4356,8 +4619,8 @@
         </p:nvSpPr>
         <p:spPr>
           <a:xfrm>
-            <a:off x="990600" y="898834"/>
-            <a:ext cx="4114800" cy="369332"/>
+            <a:off x="457200" y="898834"/>
+            <a:ext cx="4648200" cy="1477328"/>
           </a:xfrm>
           <a:prstGeom prst="rect">
             <a:avLst/>
@@ -4375,18 +4638,27 @@
               <a:buChar char="•"/>
             </a:pPr>
             <a:r>
-              <a:rPr lang="en-US" dirty="0" smtClean="0">
-                <a:solidFill>
-                  <a:srgbClr val="FF0000"/>
-                </a:solidFill>
-              </a:rPr>
-              <a:t>(Description)</a:t>
-            </a:r>
-            <a:endParaRPr lang="en-US" dirty="0">
-              <a:solidFill>
-                <a:srgbClr val="FF0000"/>
-              </a:solidFill>
-            </a:endParaRPr>
+              <a:rPr lang="en-US" dirty="0" smtClean="0"/>
+              <a:t>PST captures edges in low contrast areas where other detectors fail to do </a:t>
+            </a:r>
+          </a:p>
+          <a:p>
+            <a:pPr marL="285750" indent="-285750">
+              <a:buFont typeface="Arial" panose="020B0604020202020204" pitchFamily="34" charset="0"/>
+              <a:buChar char="•"/>
+            </a:pPr>
+            <a:endParaRPr lang="en-US" dirty="0"/>
+          </a:p>
+          <a:p>
+            <a:pPr marL="285750" indent="-285750">
+              <a:buFont typeface="Arial" panose="020B0604020202020204" pitchFamily="34" charset="0"/>
+              <a:buChar char="•"/>
+            </a:pPr>
+            <a:r>
+              <a:rPr lang="en-US" dirty="0" smtClean="0"/>
+              <a:t>This is due to PST’s inherent brightness equalization property </a:t>
+            </a:r>
+            <a:endParaRPr lang="en-US" dirty="0"/>
           </a:p>
         </p:txBody>
       </p:sp>
@@ -4394,155 +4666,6 @@
     <p:extLst>
       <p:ext uri="{BB962C8B-B14F-4D97-AF65-F5344CB8AC3E}">
         <p14:creationId xmlns:p14="http://schemas.microsoft.com/office/powerpoint/2010/main" val="3467052807"/>
-      </p:ext>
-    </p:extLst>
-  </p:cSld>
-  <p:clrMapOvr>
-    <a:masterClrMapping/>
-  </p:clrMapOvr>
-  <p:timing>
-    <p:tnLst>
-      <p:par>
-        <p:cTn id="1" dur="indefinite" restart="never" nodeType="tmRoot"/>
-      </p:par>
-    </p:tnLst>
-  </p:timing>
-</p:sld>
-</file>
-
-<file path=ppt/slides/slide12.xml><?xml version="1.0" encoding="utf-8"?>
-<p:sld xmlns:a="http://schemas.openxmlformats.org/drawingml/2006/main" xmlns:r="http://schemas.openxmlformats.org/officeDocument/2006/relationships" xmlns:p="http://schemas.openxmlformats.org/presentationml/2006/main">
-  <p:cSld>
-    <p:spTree>
-      <p:nvGrpSpPr>
-        <p:cNvPr id="1" name=""/>
-        <p:cNvGrpSpPr/>
-        <p:nvPr/>
-      </p:nvGrpSpPr>
-      <p:grpSpPr>
-        <a:xfrm>
-          <a:off x="0" y="0"/>
-          <a:ext cx="0" cy="0"/>
-          <a:chOff x="0" y="0"/>
-          <a:chExt cx="0" cy="0"/>
-        </a:xfrm>
-      </p:grpSpPr>
-      <p:sp>
-        <p:nvSpPr>
-          <p:cNvPr id="2" name="Title 1"/>
-          <p:cNvSpPr>
-            <a:spLocks noGrp="1"/>
-          </p:cNvSpPr>
-          <p:nvPr>
-            <p:ph type="title"/>
-          </p:nvPr>
-        </p:nvSpPr>
-        <p:spPr>
-          <a:xfrm>
-            <a:off x="457200" y="274638"/>
-            <a:ext cx="8229600" cy="715962"/>
-          </a:xfrm>
-        </p:spPr>
-        <p:txBody>
-          <a:bodyPr>
-            <a:normAutofit/>
-          </a:bodyPr>
-          <a:lstStyle/>
-          <a:p>
-            <a:r>
-              <a:rPr lang="en-US" sz="3200" dirty="0" smtClean="0"/>
-              <a:t>Tracking the Cells over Time</a:t>
-            </a:r>
-            <a:endParaRPr lang="en-US" sz="3200" dirty="0"/>
-          </a:p>
-        </p:txBody>
-      </p:sp>
-      <p:sp>
-        <p:nvSpPr>
-          <p:cNvPr id="3" name="Content Placeholder 2"/>
-          <p:cNvSpPr>
-            <a:spLocks noGrp="1"/>
-          </p:cNvSpPr>
-          <p:nvPr>
-            <p:ph idx="1"/>
-          </p:nvPr>
-        </p:nvSpPr>
-        <p:spPr>
-          <a:xfrm>
-            <a:off x="457200" y="1066800"/>
-            <a:ext cx="8229600" cy="5059363"/>
-          </a:xfrm>
-        </p:spPr>
-        <p:txBody>
-          <a:bodyPr>
-            <a:normAutofit/>
-          </a:bodyPr>
-          <a:lstStyle/>
-          <a:p>
-            <a:r>
-              <a:rPr lang="en-US" sz="2000" dirty="0" smtClean="0"/>
-              <a:t>To track cells over time, we are working on a solution based on centroid detection</a:t>
-            </a:r>
-          </a:p>
-          <a:p>
-            <a:pPr marL="0" indent="0">
-              <a:buNone/>
-            </a:pPr>
-            <a:endParaRPr lang="en-US" sz="2000" dirty="0"/>
-          </a:p>
-          <a:p>
-            <a:r>
-              <a:rPr lang="en-US" sz="2000" dirty="0"/>
-              <a:t>Still work in </a:t>
-            </a:r>
-            <a:r>
-              <a:rPr lang="en-US" sz="2000" dirty="0" smtClean="0"/>
-              <a:t>progress; </a:t>
-            </a:r>
-            <a:r>
-              <a:rPr lang="en-US" sz="2000" dirty="0" smtClean="0"/>
-              <a:t>Currently working an issue of encountering multiple centroids for larger cells</a:t>
-            </a:r>
-          </a:p>
-          <a:p>
-            <a:endParaRPr lang="en-US" sz="2000" dirty="0" smtClean="0"/>
-          </a:p>
-          <a:p>
-            <a:endParaRPr lang="en-US" sz="2000" dirty="0" smtClean="0"/>
-          </a:p>
-          <a:p>
-            <a:endParaRPr lang="en-US" sz="2000" dirty="0"/>
-          </a:p>
-        </p:txBody>
-      </p:sp>
-      <p:pic>
-        <p:nvPicPr>
-          <p:cNvPr id="5" name="Picture 4"/>
-          <p:cNvPicPr>
-            <a:picLocks noChangeAspect="1"/>
-          </p:cNvPicPr>
-          <p:nvPr/>
-        </p:nvPicPr>
-        <p:blipFill>
-          <a:blip r:embed="rId2"/>
-          <a:stretch>
-            <a:fillRect/>
-          </a:stretch>
-        </p:blipFill>
-        <p:spPr>
-          <a:xfrm>
-            <a:off x="5197186" y="3060701"/>
-            <a:ext cx="3489614" cy="3065462"/>
-          </a:xfrm>
-          <a:prstGeom prst="rect">
-            <a:avLst/>
-          </a:prstGeom>
-        </p:spPr>
-      </p:pic>
-    </p:spTree>
-    <p:extLst>
-      <p:ext uri="{BB962C8B-B14F-4D97-AF65-F5344CB8AC3E}">
-        <p14:creationId xmlns:p14="http://schemas.microsoft.com/office/powerpoint/2010/main" val="3065958281"/>
       </p:ext>
     </p:extLst>
   </p:cSld>
@@ -4586,6 +4709,117 @@
             <p:ph type="title"/>
           </p:nvPr>
         </p:nvSpPr>
+        <p:spPr>
+          <a:xfrm>
+            <a:off x="457200" y="274638"/>
+            <a:ext cx="8229600" cy="715962"/>
+          </a:xfrm>
+        </p:spPr>
+        <p:txBody>
+          <a:bodyPr>
+            <a:normAutofit/>
+          </a:bodyPr>
+          <a:lstStyle/>
+          <a:p>
+            <a:r>
+              <a:rPr lang="en-US" sz="3200" dirty="0" smtClean="0"/>
+              <a:t>Tracking the Cells over Time</a:t>
+            </a:r>
+            <a:endParaRPr lang="en-US" sz="3200" dirty="0"/>
+          </a:p>
+        </p:txBody>
+      </p:sp>
+      <p:sp>
+        <p:nvSpPr>
+          <p:cNvPr id="3" name="Content Placeholder 2"/>
+          <p:cNvSpPr>
+            <a:spLocks noGrp="1"/>
+          </p:cNvSpPr>
+          <p:nvPr>
+            <p:ph idx="1"/>
+          </p:nvPr>
+        </p:nvSpPr>
+        <p:spPr>
+          <a:xfrm>
+            <a:off x="457200" y="1066800"/>
+            <a:ext cx="8229600" cy="5059363"/>
+          </a:xfrm>
+        </p:spPr>
+        <p:txBody>
+          <a:bodyPr>
+            <a:normAutofit/>
+          </a:bodyPr>
+          <a:lstStyle/>
+          <a:p>
+            <a:r>
+              <a:rPr lang="en-US" sz="2000" dirty="0" smtClean="0"/>
+              <a:t>To track cells over time, we are working on a solution based on centroid detection</a:t>
+            </a:r>
+          </a:p>
+          <a:p>
+            <a:pPr marL="0" indent="0">
+              <a:buNone/>
+            </a:pPr>
+            <a:endParaRPr lang="en-US" sz="2000" dirty="0"/>
+          </a:p>
+          <a:p>
+            <a:endParaRPr lang="en-US" sz="2000" dirty="0" smtClean="0"/>
+          </a:p>
+          <a:p>
+            <a:endParaRPr lang="en-US" sz="2000" dirty="0" smtClean="0"/>
+          </a:p>
+          <a:p>
+            <a:endParaRPr lang="en-US" sz="2000" dirty="0"/>
+          </a:p>
+        </p:txBody>
+      </p:sp>
+    </p:spTree>
+    <p:extLst>
+      <p:ext uri="{BB962C8B-B14F-4D97-AF65-F5344CB8AC3E}">
+        <p14:creationId xmlns:p14="http://schemas.microsoft.com/office/powerpoint/2010/main" val="3065958281"/>
+      </p:ext>
+    </p:extLst>
+  </p:cSld>
+  <p:clrMapOvr>
+    <a:masterClrMapping/>
+  </p:clrMapOvr>
+  <p:timing>
+    <p:tnLst>
+      <p:par>
+        <p:cTn id="1" dur="indefinite" restart="never" nodeType="tmRoot"/>
+      </p:par>
+    </p:tnLst>
+  </p:timing>
+</p:sld>
+</file>
+
+<file path=ppt/slides/slide14.xml><?xml version="1.0" encoding="utf-8"?>
+<p:sld xmlns:a="http://schemas.openxmlformats.org/drawingml/2006/main" xmlns:r="http://schemas.openxmlformats.org/officeDocument/2006/relationships" xmlns:p="http://schemas.openxmlformats.org/presentationml/2006/main">
+  <p:cSld>
+    <p:spTree>
+      <p:nvGrpSpPr>
+        <p:cNvPr id="1" name=""/>
+        <p:cNvGrpSpPr/>
+        <p:nvPr/>
+      </p:nvGrpSpPr>
+      <p:grpSpPr>
+        <a:xfrm>
+          <a:off x="0" y="0"/>
+          <a:ext cx="0" cy="0"/>
+          <a:chOff x="0" y="0"/>
+          <a:chExt cx="0" cy="0"/>
+        </a:xfrm>
+      </p:grpSpPr>
+      <p:sp>
+        <p:nvSpPr>
+          <p:cNvPr id="2" name="Title 1"/>
+          <p:cNvSpPr>
+            <a:spLocks noGrp="1"/>
+          </p:cNvSpPr>
+          <p:nvPr>
+            <p:ph type="title"/>
+          </p:nvPr>
+        </p:nvSpPr>
         <p:spPr/>
         <p:txBody>
           <a:bodyPr/>
@@ -4799,13 +5033,8 @@
             <a:pPr lvl="1"/>
             <a:r>
               <a:rPr lang="en-US" sz="1600" dirty="0" smtClean="0"/>
-              <a:t>Extensio</a:t>
-            </a:r>
-            <a:r>
-              <a:rPr lang="en-US" sz="1600" dirty="0" smtClean="0"/>
-              <a:t>n to 3D PST</a:t>
-            </a:r>
-            <a:endParaRPr lang="en-US" sz="1600" dirty="0" smtClean="0"/>
+              <a:t>Extension to 3D PST</a:t>
+            </a:r>
           </a:p>
           <a:p>
             <a:r>
@@ -4826,7 +5055,6 @@
               <a:rPr lang="en-US" sz="1600" dirty="0" smtClean="0"/>
               <a:t>Compare with other types of edge detectors</a:t>
             </a:r>
-            <a:endParaRPr lang="en-US" sz="1600" dirty="0" smtClean="0"/>
           </a:p>
           <a:p>
             <a:r>
@@ -4933,11 +5161,7 @@
             <a:pPr lvl="1"/>
             <a:r>
               <a:rPr lang="en-US" sz="2000" dirty="0" smtClean="0"/>
-              <a:t>Although long-term imaging is possible, </a:t>
-            </a:r>
-            <a:r>
-              <a:rPr lang="en-US" sz="2000" dirty="0" smtClean="0"/>
-              <a:t>issues like </a:t>
+              <a:t>Although long-term imaging is possible, issues like </a:t>
             </a:r>
             <a:r>
               <a:rPr lang="en-US" sz="2000" dirty="0" err="1" smtClean="0"/>
@@ -4947,7 +5171,6 @@
               <a:rPr lang="en-US" sz="2000" dirty="0" smtClean="0"/>
               <a:t> hinder the process</a:t>
             </a:r>
-            <a:endParaRPr lang="en-US" sz="2000" dirty="0" smtClean="0"/>
           </a:p>
           <a:p>
             <a:pPr lvl="1">
@@ -4958,11 +5181,7 @@
           <a:p>
             <a:r>
               <a:rPr lang="en-US" sz="2000" dirty="0" smtClean="0"/>
-              <a:t>One novel </a:t>
-            </a:r>
-            <a:r>
-              <a:rPr lang="en-US" sz="2000" dirty="0" smtClean="0"/>
-              <a:t>technique is to employ Phase Stretch Transform (PST)</a:t>
+              <a:t>One novel technique is to employ Phase Stretch Transform (PST)</a:t>
             </a:r>
           </a:p>
           <a:p>
@@ -5102,11 +5321,7 @@
           <a:p>
             <a:r>
               <a:rPr lang="en-US" sz="2000" dirty="0" smtClean="0"/>
-              <a:t>Has roots in photonic phase time stretch </a:t>
-            </a:r>
-            <a:r>
-              <a:rPr lang="en-US" sz="2000" dirty="0" smtClean="0"/>
-              <a:t>technique</a:t>
+              <a:t>Has roots in photonic phase time stretch technique</a:t>
             </a:r>
           </a:p>
           <a:p>
@@ -5239,21 +5454,14 @@
             <a:endParaRPr lang="en-US" sz="1600" dirty="0" smtClean="0"/>
           </a:p>
           <a:p>
+            <a:endParaRPr lang="en-US" sz="2000" dirty="0" smtClean="0"/>
+          </a:p>
+          <a:p>
             <a:r>
               <a:rPr lang="en-US" sz="2000" dirty="0" smtClean="0"/>
-              <a:t>A common phase kernel used is one in which the kernel phase derivative is linear or sublinear </a:t>
-            </a:r>
-          </a:p>
-          <a:p>
-            <a:pPr lvl="1"/>
-            <a:r>
-              <a:rPr lang="en-US" sz="1600" dirty="0" smtClean="0"/>
-              <a:t>An example of such a phase derivative profiles is the inverse tangent function</a:t>
-            </a:r>
-          </a:p>
-          <a:p>
-            <a:pPr lvl="1"/>
-            <a:endParaRPr lang="en-US" sz="1600" dirty="0" smtClean="0"/>
+              <a:t>Argument is defined as the stretch operator and is a complex quantity</a:t>
+            </a:r>
+            <a:endParaRPr lang="en-US" sz="2000" dirty="0" smtClean="0"/>
           </a:p>
           <a:p>
             <a:pPr lvl="1"/>
@@ -5341,17 +5549,23 @@
           <p:cNvGraphicFramePr>
             <a:graphicFrameLocks noChangeAspect="1"/>
           </p:cNvGraphicFramePr>
-          <p:nvPr/>
+          <p:nvPr>
+            <p:extLst>
+              <p:ext uri="{D42A27DB-BD31-4B8C-83A1-F6EECF244321}">
+                <p14:modId xmlns:p14="http://schemas.microsoft.com/office/powerpoint/2010/main" val="4095154537"/>
+              </p:ext>
+            </p:extLst>
+          </p:nvPr>
         </p:nvGraphicFramePr>
         <p:xfrm>
-          <a:off x="892572" y="3240837"/>
+          <a:off x="892572" y="3352800"/>
           <a:ext cx="7358856" cy="461549"/>
         </p:xfrm>
         <a:graphic>
           <a:graphicData uri="http://schemas.openxmlformats.org/presentationml/2006/ole">
             <mc:AlternateContent xmlns:mc="http://schemas.openxmlformats.org/markup-compatibility/2006">
               <mc:Choice xmlns:v="urn:schemas-microsoft-com:vml" Requires="v">
-                <p:oleObj spid="_x0000_s1046" name="Equation" r:id="rId5" imgW="4851360" imgH="304560" progId="Equation.3">
+                <p:oleObj spid="_x0000_s1054" name="Equation" r:id="rId5" imgW="4851360" imgH="304560" progId="Equation.3">
                   <p:embed/>
                 </p:oleObj>
               </mc:Choice>
@@ -5381,78 +5595,8 @@
                     </p:blipFill>
                     <p:spPr bwMode="auto">
                       <a:xfrm>
-                        <a:off x="892572" y="3240837"/>
+                        <a:off x="892572" y="3352800"/>
                         <a:ext cx="7358856" cy="461549"/>
-                      </a:xfrm>
-                      <a:prstGeom prst="rect">
-                        <a:avLst/>
-                      </a:prstGeom>
-                      <a:noFill/>
-                      <a:extLst>
-                        <a:ext uri="{909E8E84-426E-40DD-AFC4-6F175D3DCCD1}">
-                          <a14:hiddenFill xmlns:a14="http://schemas.microsoft.com/office/drawing/2010/main">
-                            <a:solidFill>
-                              <a:srgbClr val="FFFFFF"/>
-                            </a:solidFill>
-                          </a14:hiddenFill>
-                        </a:ext>
-                      </a:extLst>
-                    </p:spPr>
-                  </p:pic>
-                </p:oleObj>
-              </mc:Fallback>
-            </mc:AlternateContent>
-          </a:graphicData>
-        </a:graphic>
-      </p:graphicFrame>
-      <p:graphicFrame>
-        <p:nvGraphicFramePr>
-          <p:cNvPr id="1027" name="Object 3"/>
-          <p:cNvGraphicFramePr>
-            <a:graphicFrameLocks noChangeAspect="1"/>
-          </p:cNvGraphicFramePr>
-          <p:nvPr/>
-        </p:nvGraphicFramePr>
-        <p:xfrm>
-          <a:off x="1907382" y="4927600"/>
-          <a:ext cx="5329237" cy="787400"/>
-        </p:xfrm>
-        <a:graphic>
-          <a:graphicData uri="http://schemas.openxmlformats.org/presentationml/2006/ole">
-            <mc:AlternateContent xmlns:mc="http://schemas.openxmlformats.org/markup-compatibility/2006">
-              <mc:Choice xmlns:v="urn:schemas-microsoft-com:vml" Requires="v">
-                <p:oleObj spid="_x0000_s1047" name="Equation" r:id="rId7" imgW="3784320" imgH="558720" progId="Equation.3">
-                  <p:embed/>
-                </p:oleObj>
-              </mc:Choice>
-              <mc:Fallback>
-                <p:oleObj name="Equation" r:id="rId7" imgW="3784320" imgH="558720" progId="Equation.3">
-                  <p:embed/>
-                  <p:pic>
-                    <p:nvPicPr>
-                      <p:cNvPr id="0" name="Picture 3"/>
-                      <p:cNvPicPr>
-                        <a:picLocks noChangeAspect="1" noChangeArrowheads="1"/>
-                      </p:cNvPicPr>
-                      <p:nvPr/>
-                    </p:nvPicPr>
-                    <p:blipFill>
-                      <a:blip r:embed="rId8">
-                        <a:extLst>
-                          <a:ext uri="{28A0092B-C50C-407E-A947-70E740481C1C}">
-                            <a14:useLocalDpi xmlns:a14="http://schemas.microsoft.com/office/drawing/2010/main" val="0"/>
-                          </a:ext>
-                        </a:extLst>
-                      </a:blip>
-                      <a:srcRect/>
-                      <a:stretch>
-                        <a:fillRect/>
-                      </a:stretch>
-                    </p:blipFill>
-                    <p:spPr bwMode="auto">
-                      <a:xfrm>
-                        <a:off x="1907382" y="4927600"/>
-                        <a:ext cx="5329237" cy="787400"/>
                       </a:xfrm>
                       <a:prstGeom prst="rect">
                         <a:avLst/>
@@ -5560,8 +5704,42 @@
           <a:lstStyle/>
           <a:p>
             <a:r>
+              <a:rPr lang="en-US" sz="2000" dirty="0"/>
+              <a:t>A common phase kernel used is one in which the kernel phase derivative is linear or sublinear </a:t>
+            </a:r>
+          </a:p>
+          <a:p>
+            <a:pPr lvl="1"/>
+            <a:r>
+              <a:rPr lang="en-US" sz="1600" dirty="0"/>
+              <a:t>An example of such a phase derivative profiles is the inverse tangent </a:t>
+            </a:r>
+            <a:r>
+              <a:rPr lang="en-US" sz="1600" dirty="0" smtClean="0"/>
+              <a:t>function</a:t>
+            </a:r>
+          </a:p>
+          <a:p>
+            <a:pPr lvl="1"/>
+            <a:endParaRPr lang="en-US" sz="1600" dirty="0"/>
+          </a:p>
+          <a:p>
+            <a:pPr marL="0" indent="0">
+              <a:buNone/>
+            </a:pPr>
+            <a:endParaRPr lang="en-US" sz="2000" dirty="0" smtClean="0"/>
+          </a:p>
+          <a:p>
+            <a:endParaRPr lang="en-US" sz="2000" dirty="0"/>
+          </a:p>
+          <a:p>
+            <a:r>
               <a:rPr lang="en-US" sz="2000" dirty="0" smtClean="0"/>
-              <a:t>Parameters S and W of the kernel control the edge detection process</a:t>
+              <a:t>Parameters </a:t>
+            </a:r>
+            <a:r>
+              <a:rPr lang="en-US" sz="2000" dirty="0" smtClean="0"/>
+              <a:t>S and W of the kernel control the edge detection process</a:t>
             </a:r>
           </a:p>
           <a:p>
@@ -5591,30 +5769,14 @@
           <a:p>
             <a:r>
               <a:rPr lang="en-US" sz="2000" dirty="0" smtClean="0"/>
-              <a:t>Once </a:t>
-            </a:r>
-            <a:r>
-              <a:rPr lang="en-US" sz="2000" dirty="0" smtClean="0"/>
-              <a:t>the PST is applied, the image is further post-processed. </a:t>
+              <a:t>Once the PST is applied, the image is further post-processed. </a:t>
             </a:r>
           </a:p>
           <a:p>
             <a:pPr lvl="1"/>
             <a:r>
               <a:rPr lang="en-US" sz="1600" dirty="0" smtClean="0"/>
-              <a:t>For edge detection, post-processing </a:t>
-            </a:r>
-            <a:r>
-              <a:rPr lang="en-US" sz="1600" dirty="0" smtClean="0"/>
-              <a:t>can include </a:t>
-            </a:r>
-            <a:r>
-              <a:rPr lang="en-US" sz="1600" dirty="0" smtClean="0"/>
-              <a:t>cutting negative phase values, thresholding, and morphological </a:t>
-            </a:r>
-            <a:r>
-              <a:rPr lang="en-US" sz="1600" dirty="0" smtClean="0"/>
-              <a:t>operations</a:t>
+              <a:t>For edge detection, post-processing can include cutting negative phase values, thresholding, and morphological operations</a:t>
             </a:r>
           </a:p>
           <a:p>
@@ -5631,7 +5793,6 @@
               <a:rPr lang="en-US" sz="1600" dirty="0" smtClean="0"/>
               <a:t> the PST output phase image</a:t>
             </a:r>
-            <a:endParaRPr lang="en-US" sz="1600" dirty="0" smtClean="0"/>
           </a:p>
           <a:p>
             <a:pPr lvl="1"/>
@@ -5674,6 +5835,82 @@
           </a:p>
         </p:txBody>
       </p:sp>
+      <p:graphicFrame>
+        <p:nvGraphicFramePr>
+          <p:cNvPr id="6" name="Object 3"/>
+          <p:cNvGraphicFramePr>
+            <a:graphicFrameLocks noChangeAspect="1"/>
+          </p:cNvGraphicFramePr>
+          <p:nvPr>
+            <p:extLst>
+              <p:ext uri="{D42A27DB-BD31-4B8C-83A1-F6EECF244321}">
+                <p14:modId xmlns:p14="http://schemas.microsoft.com/office/powerpoint/2010/main" val="2672812722"/>
+              </p:ext>
+            </p:extLst>
+          </p:nvPr>
+        </p:nvGraphicFramePr>
+        <p:xfrm>
+          <a:off x="1909763" y="2133600"/>
+          <a:ext cx="5329237" cy="787400"/>
+        </p:xfrm>
+        <a:graphic>
+          <a:graphicData uri="http://schemas.openxmlformats.org/presentationml/2006/ole">
+            <mc:AlternateContent xmlns:mc="http://schemas.openxmlformats.org/markup-compatibility/2006">
+              <mc:Choice xmlns:v="urn:schemas-microsoft-com:vml" Requires="v">
+                <p:oleObj spid="_x0000_s2053" name="Equation" r:id="rId4" imgW="3784320" imgH="558720" progId="Equation.3">
+                  <p:embed/>
+                </p:oleObj>
+              </mc:Choice>
+              <mc:Fallback>
+                <p:oleObj name="Equation" r:id="rId4" imgW="3784320" imgH="558720" progId="Equation.3">
+                  <p:embed/>
+                  <p:pic>
+                    <p:nvPicPr>
+                      <p:cNvPr id="8" name="Object 3"/>
+                      <p:cNvPicPr>
+                        <a:picLocks noChangeAspect="1" noChangeArrowheads="1"/>
+                      </p:cNvPicPr>
+                      <p:nvPr/>
+                    </p:nvPicPr>
+                    <p:blipFill>
+                      <a:blip r:embed="rId5">
+                        <a:extLst>
+                          <a:ext uri="{28A0092B-C50C-407E-A947-70E740481C1C}">
+                            <a14:useLocalDpi xmlns:a14="http://schemas.microsoft.com/office/drawing/2010/main" val="0"/>
+                          </a:ext>
+                        </a:extLst>
+                      </a:blip>
+                      <a:srcRect/>
+                      <a:stretch>
+                        <a:fillRect/>
+                      </a:stretch>
+                    </p:blipFill>
+                    <p:spPr bwMode="auto">
+                      <a:xfrm>
+                        <a:off x="1909763" y="2133600"/>
+                        <a:ext cx="5329237" cy="787400"/>
+                      </a:xfrm>
+                      <a:prstGeom prst="rect">
+                        <a:avLst/>
+                      </a:prstGeom>
+                      <a:noFill/>
+                      <a:extLst>
+                        <a:ext uri="{909E8E84-426E-40DD-AFC4-6F175D3DCCD1}">
+                          <a14:hiddenFill xmlns:a14="http://schemas.microsoft.com/office/drawing/2010/main">
+                            <a:solidFill>
+                              <a:srgbClr val="FFFFFF"/>
+                            </a:solidFill>
+                          </a14:hiddenFill>
+                        </a:ext>
+                      </a:extLst>
+                    </p:spPr>
+                  </p:pic>
+                </p:oleObj>
+              </mc:Fallback>
+            </mc:AlternateContent>
+          </a:graphicData>
+        </a:graphic>
+      </p:graphicFrame>
     </p:spTree>
   </p:cSld>
   <p:clrMapOvr>
@@ -5718,8 +5955,38 @@
         </p:nvSpPr>
         <p:spPr>
           <a:xfrm>
-            <a:off x="304800" y="304800"/>
-            <a:ext cx="8229600" cy="715962"/>
+            <a:off x="457200" y="274638"/>
+            <a:ext cx="8229600" cy="487362"/>
+          </a:xfrm>
+        </p:spPr>
+        <p:txBody>
+          <a:bodyPr>
+            <a:normAutofit fontScale="90000"/>
+          </a:bodyPr>
+          <a:lstStyle/>
+          <a:p>
+            <a:r>
+              <a:rPr lang="en-US" sz="3200" dirty="0" smtClean="0"/>
+              <a:t>Phase Stretch Transform: Mathematical Description</a:t>
+            </a:r>
+            <a:endParaRPr lang="en-US" sz="3200" dirty="0"/>
+          </a:p>
+        </p:txBody>
+      </p:sp>
+      <p:sp>
+        <p:nvSpPr>
+          <p:cNvPr id="3" name="Content Placeholder 2"/>
+          <p:cNvSpPr>
+            <a:spLocks noGrp="1"/>
+          </p:cNvSpPr>
+          <p:nvPr>
+            <p:ph idx="1"/>
+          </p:nvPr>
+        </p:nvSpPr>
+        <p:spPr>
+          <a:xfrm>
+            <a:off x="228600" y="975518"/>
+            <a:ext cx="4572000" cy="5135563"/>
           </a:xfrm>
         </p:spPr>
         <p:txBody>
@@ -5729,64 +5996,590 @@
           <a:lstStyle/>
           <a:p>
             <a:r>
-              <a:rPr lang="en-US" sz="3200" dirty="0" smtClean="0"/>
-              <a:t>Extending the Algorithm to 3D</a:t>
-            </a:r>
-            <a:endParaRPr lang="en-US" sz="3200" dirty="0"/>
-          </a:p>
-        </p:txBody>
-      </p:sp>
-      <p:sp>
-        <p:nvSpPr>
-          <p:cNvPr id="3" name="Content Placeholder 2"/>
-          <p:cNvSpPr>
-            <a:spLocks noGrp="1"/>
-          </p:cNvSpPr>
-          <p:nvPr>
-            <p:ph idx="1"/>
-          </p:nvPr>
+              <a:rPr lang="en-US" sz="2000" dirty="0" smtClean="0"/>
+              <a:t>PST functionality can be understood through the closed form expression in the 1D case under some simplifying assumptions</a:t>
+            </a:r>
+          </a:p>
+          <a:p>
+            <a:pPr lvl="1"/>
+            <a:r>
+              <a:rPr lang="en-US" sz="1600" dirty="0" smtClean="0"/>
+              <a:t>Output of the PST is related to the</a:t>
+            </a:r>
+            <a:r>
+              <a:rPr lang="en-US" sz="1600" i="1" dirty="0" smtClean="0"/>
+              <a:t> even-order</a:t>
+            </a:r>
+            <a:r>
+              <a:rPr lang="en-US" sz="1600" dirty="0" smtClean="0"/>
+              <a:t> derivatives of the input with weighting factors</a:t>
+            </a:r>
+          </a:p>
+          <a:p>
+            <a:pPr lvl="1"/>
+            <a:r>
+              <a:rPr lang="en-US" sz="1600" dirty="0" smtClean="0"/>
+              <a:t>Each derivative detects a different feature </a:t>
+            </a:r>
+          </a:p>
+          <a:p>
+            <a:pPr lvl="1"/>
+            <a:r>
+              <a:rPr lang="en-US" sz="1600" dirty="0" smtClean="0"/>
+              <a:t>Weighting factors can be designed to detect different features of interest</a:t>
+            </a:r>
+          </a:p>
+          <a:p>
+            <a:endParaRPr lang="en-US" sz="1600" dirty="0"/>
+          </a:p>
+          <a:p>
+            <a:r>
+              <a:rPr lang="en-US" sz="1600" dirty="0" smtClean="0"/>
+              <a:t>The output of PST is inversely related to the brightness (valid for small phase)</a:t>
+            </a:r>
+          </a:p>
+          <a:p>
+            <a:pPr lvl="1"/>
+            <a:r>
+              <a:rPr lang="en-US" sz="1600" dirty="0" smtClean="0"/>
+              <a:t>Output is larger for lower light regions of the image</a:t>
+            </a:r>
+          </a:p>
+          <a:p>
+            <a:pPr lvl="1"/>
+            <a:r>
+              <a:rPr lang="en-US" sz="1600" dirty="0" smtClean="0"/>
+              <a:t>This property equalizes the input brightness and allows for more sensitive feature detection and enhancement</a:t>
+            </a:r>
+          </a:p>
+          <a:p>
+            <a:pPr lvl="1"/>
+            <a:endParaRPr lang="en-US" sz="1200" dirty="0"/>
+          </a:p>
+          <a:p>
+            <a:pPr lvl="1"/>
+            <a:endParaRPr lang="en-US" sz="1600" dirty="0" smtClean="0"/>
+          </a:p>
+        </p:txBody>
+      </p:sp>
+      <p:sp>
+        <p:nvSpPr>
+          <p:cNvPr id="5" name="Rectangle 4"/>
+          <p:cNvSpPr/>
+          <p:nvPr/>
         </p:nvSpPr>
         <p:spPr>
           <a:xfrm>
-            <a:off x="457200" y="1020762"/>
-            <a:ext cx="8229600" cy="5059363"/>
+            <a:off x="152400" y="6324600"/>
+            <a:ext cx="8839200" cy="369332"/>
           </a:xfrm>
+          <a:prstGeom prst="rect">
+            <a:avLst/>
+          </a:prstGeom>
         </p:spPr>
         <p:txBody>
-          <a:bodyPr>
-            <a:normAutofit/>
+          <a:bodyPr wrap="square">
+            <a:spAutoFit/>
           </a:bodyPr>
           <a:lstStyle/>
           <a:p>
             <a:r>
-              <a:rPr lang="en-US" sz="2000" dirty="0" smtClean="0">
+              <a:rPr lang="en-US" dirty="0" smtClean="0">
                 <a:solidFill>
                   <a:srgbClr val="FF0000"/>
                 </a:solidFill>
               </a:rPr>
-              <a:t>Add and describe code changes here</a:t>
-            </a:r>
-            <a:endParaRPr lang="en-US" sz="2400" dirty="0">
-              <a:solidFill>
-                <a:srgbClr val="FF0000"/>
-              </a:solidFill>
-            </a:endParaRPr>
-          </a:p>
-          <a:p>
-            <a:endParaRPr lang="en-US" sz="2000" dirty="0" smtClean="0"/>
-          </a:p>
-          <a:p>
-            <a:endParaRPr lang="en-US" sz="2200" dirty="0" smtClean="0"/>
-          </a:p>
-          <a:p>
-            <a:endParaRPr lang="en-US" sz="2000" dirty="0" smtClean="0"/>
-          </a:p>
-          <a:p>
-            <a:endParaRPr lang="en-US" sz="2000" dirty="0"/>
-          </a:p>
-        </p:txBody>
-      </p:sp>
+              <a:t>Feature Enhancement in Visually Impaired Images</a:t>
+            </a:r>
+            <a:r>
+              <a:rPr lang="en-US" dirty="0" smtClean="0">
+                <a:solidFill>
+                  <a:srgbClr val="FF0000"/>
+                </a:solidFill>
+              </a:rPr>
+              <a:t> (</a:t>
+            </a:r>
+            <a:r>
+              <a:rPr lang="en-US" dirty="0" smtClean="0">
+                <a:solidFill>
+                  <a:srgbClr val="FF0000"/>
+                </a:solidFill>
+              </a:rPr>
+              <a:t>source)</a:t>
+            </a:r>
+          </a:p>
+        </p:txBody>
+      </p:sp>
+      <mc:AlternateContent xmlns:mc="http://schemas.openxmlformats.org/markup-compatibility/2006">
+        <mc:Choice xmlns:a14="http://schemas.microsoft.com/office/drawing/2010/main" Requires="a14">
+          <p:sp>
+            <p:nvSpPr>
+              <p:cNvPr id="7" name="TextBox 6"/>
+              <p:cNvSpPr txBox="1"/>
+              <p:nvPr/>
+            </p:nvSpPr>
+            <p:spPr>
+              <a:xfrm>
+                <a:off x="5029200" y="1143000"/>
+                <a:ext cx="3962401" cy="861390"/>
+              </a:xfrm>
+              <a:prstGeom prst="rect">
+                <a:avLst/>
+              </a:prstGeom>
+              <a:noFill/>
+            </p:spPr>
+            <p:txBody>
+              <a:bodyPr wrap="square" lIns="0" tIns="0" rIns="0" bIns="0" rtlCol="0">
+                <a:spAutoFit/>
+              </a:bodyPr>
+              <a:lstStyle/>
+              <a:p>
+                <a14:m>
+                  <m:oMathPara xmlns:m="http://schemas.openxmlformats.org/officeDocument/2006/math">
+                    <m:oMathParaPr>
+                      <m:jc m:val="centerGroup"/>
+                    </m:oMathParaPr>
+                    <m:oMath xmlns:m="http://schemas.openxmlformats.org/officeDocument/2006/math">
+                      <m:r>
+                        <a:rPr lang="en-US" b="0" i="1" smtClean="0">
+                          <a:latin typeface="Cambria Math" panose="02040503050406030204" pitchFamily="18" charset="0"/>
+                        </a:rPr>
+                        <m:t>𝑃𝑆𝑇</m:t>
+                      </m:r>
+                      <m:d>
+                        <m:dPr>
+                          <m:begChr m:val="{"/>
+                          <m:endChr m:val="}"/>
+                          <m:ctrlPr>
+                            <a:rPr lang="en-US" b="0" i="1" smtClean="0">
+                              <a:latin typeface="Cambria Math" panose="02040503050406030204" pitchFamily="18" charset="0"/>
+                            </a:rPr>
+                          </m:ctrlPr>
+                        </m:dPr>
+                        <m:e>
+                          <m:sSub>
+                            <m:sSubPr>
+                              <m:ctrlPr>
+                                <a:rPr lang="en-US" b="0" i="1" smtClean="0">
+                                  <a:latin typeface="Cambria Math" panose="02040503050406030204" pitchFamily="18" charset="0"/>
+                                </a:rPr>
+                              </m:ctrlPr>
+                            </m:sSubPr>
+                            <m:e>
+                              <m:r>
+                                <a:rPr lang="en-US" b="0" i="1" smtClean="0">
+                                  <a:latin typeface="Cambria Math" panose="02040503050406030204" pitchFamily="18" charset="0"/>
+                                </a:rPr>
+                                <m:t>𝐸</m:t>
+                              </m:r>
+                            </m:e>
+                            <m:sub>
+                              <m:r>
+                                <a:rPr lang="en-US" b="0" i="1" smtClean="0">
+                                  <a:latin typeface="Cambria Math" panose="02040503050406030204" pitchFamily="18" charset="0"/>
+                                </a:rPr>
+                                <m:t>𝑖</m:t>
+                              </m:r>
+                            </m:sub>
+                          </m:sSub>
+                          <m:r>
+                            <a:rPr lang="en-US" b="0" i="1" smtClean="0">
+                              <a:latin typeface="Cambria Math" panose="02040503050406030204" pitchFamily="18" charset="0"/>
+                            </a:rPr>
+                            <m:t>[</m:t>
+                          </m:r>
+                          <m:r>
+                            <a:rPr lang="en-US" b="0" i="1" smtClean="0">
+                              <a:latin typeface="Cambria Math" panose="02040503050406030204" pitchFamily="18" charset="0"/>
+                            </a:rPr>
+                            <m:t>𝑥</m:t>
+                          </m:r>
+                          <m:r>
+                            <a:rPr lang="en-US" b="0" i="1" smtClean="0">
+                              <a:latin typeface="Cambria Math" panose="02040503050406030204" pitchFamily="18" charset="0"/>
+                            </a:rPr>
+                            <m:t>]</m:t>
+                          </m:r>
+                        </m:e>
+                      </m:d>
+                      <m:r>
+                        <a:rPr lang="en-US" i="1">
+                          <a:latin typeface="Cambria Math" panose="02040503050406030204" pitchFamily="18" charset="0"/>
+                          <a:ea typeface="Cambria Math" panose="02040503050406030204" pitchFamily="18" charset="0"/>
+                        </a:rPr>
+                        <m:t>≈</m:t>
+                      </m:r>
+                      <m:f>
+                        <m:fPr>
+                          <m:ctrlPr>
+                            <a:rPr lang="en-US" i="1" smtClean="0">
+                              <a:latin typeface="Cambria Math" panose="02040503050406030204" pitchFamily="18" charset="0"/>
+                              <a:ea typeface="Cambria Math" panose="02040503050406030204" pitchFamily="18" charset="0"/>
+                            </a:rPr>
+                          </m:ctrlPr>
+                        </m:fPr>
+                        <m:num>
+                          <m:nary>
+                            <m:naryPr>
+                              <m:chr m:val="∑"/>
+                              <m:ctrlPr>
+                                <a:rPr lang="en-US" i="1" smtClean="0">
+                                  <a:latin typeface="Cambria Math" panose="02040503050406030204" pitchFamily="18" charset="0"/>
+                                  <a:ea typeface="Cambria Math" panose="02040503050406030204" pitchFamily="18" charset="0"/>
+                                </a:rPr>
+                              </m:ctrlPr>
+                            </m:naryPr>
+                            <m:sub>
+                              <m:r>
+                                <m:rPr>
+                                  <m:brk m:alnAt="23"/>
+                                </m:rPr>
+                                <a:rPr lang="en-US" b="0" i="1" smtClean="0">
+                                  <a:latin typeface="Cambria Math" panose="02040503050406030204" pitchFamily="18" charset="0"/>
+                                  <a:ea typeface="Cambria Math" panose="02040503050406030204" pitchFamily="18" charset="0"/>
+                                </a:rPr>
+                                <m:t>𝑚</m:t>
+                              </m:r>
+                              <m:r>
+                                <a:rPr lang="en-US" b="0" i="1" smtClean="0">
+                                  <a:latin typeface="Cambria Math" panose="02040503050406030204" pitchFamily="18" charset="0"/>
+                                  <a:ea typeface="Cambria Math" panose="02040503050406030204" pitchFamily="18" charset="0"/>
+                                </a:rPr>
+                                <m:t>=2</m:t>
+                              </m:r>
+                            </m:sub>
+                            <m:sup>
+                              <m:r>
+                                <a:rPr lang="en-US" b="0" i="1" smtClean="0">
+                                  <a:latin typeface="Cambria Math" panose="02040503050406030204" pitchFamily="18" charset="0"/>
+                                  <a:ea typeface="Cambria Math" panose="02040503050406030204" pitchFamily="18" charset="0"/>
+                                </a:rPr>
+                                <m:t>𝑀</m:t>
+                              </m:r>
+                            </m:sup>
+                            <m:e>
+                              <m:f>
+                                <m:fPr>
+                                  <m:ctrlPr>
+                                    <a:rPr lang="en-US" i="1" smtClean="0">
+                                      <a:latin typeface="Cambria Math" panose="02040503050406030204" pitchFamily="18" charset="0"/>
+                                      <a:ea typeface="Cambria Math" panose="02040503050406030204" pitchFamily="18" charset="0"/>
+                                    </a:rPr>
+                                  </m:ctrlPr>
+                                </m:fPr>
+                                <m:num>
+                                  <m:sSup>
+                                    <m:sSupPr>
+                                      <m:ctrlPr>
+                                        <a:rPr lang="en-US" i="1" smtClean="0">
+                                          <a:latin typeface="Cambria Math" panose="02040503050406030204" pitchFamily="18" charset="0"/>
+                                          <a:ea typeface="Cambria Math" panose="02040503050406030204" pitchFamily="18" charset="0"/>
+                                        </a:rPr>
+                                      </m:ctrlPr>
+                                    </m:sSupPr>
+                                    <m:e>
+                                      <m:r>
+                                        <a:rPr lang="en-US" i="1">
+                                          <a:latin typeface="Cambria Math" panose="02040503050406030204" pitchFamily="18" charset="0"/>
+                                          <a:ea typeface="Cambria Math" panose="02040503050406030204" pitchFamily="18" charset="0"/>
+                                        </a:rPr>
+                                        <m:t>(−1)</m:t>
+                                      </m:r>
+                                    </m:e>
+                                    <m:sup>
+                                      <m:f>
+                                        <m:fPr>
+                                          <m:type m:val="lin"/>
+                                          <m:ctrlPr>
+                                            <a:rPr lang="en-US" i="1" smtClean="0">
+                                              <a:latin typeface="Cambria Math" panose="02040503050406030204" pitchFamily="18" charset="0"/>
+                                              <a:ea typeface="Cambria Math" panose="02040503050406030204" pitchFamily="18" charset="0"/>
+                                            </a:rPr>
+                                          </m:ctrlPr>
+                                        </m:fPr>
+                                        <m:num>
+                                          <m:r>
+                                            <a:rPr lang="en-US" b="0" i="1" smtClean="0">
+                                              <a:latin typeface="Cambria Math" panose="02040503050406030204" pitchFamily="18" charset="0"/>
+                                              <a:ea typeface="Cambria Math" panose="02040503050406030204" pitchFamily="18" charset="0"/>
+                                            </a:rPr>
+                                            <m:t>𝑚</m:t>
+                                          </m:r>
+                                        </m:num>
+                                        <m:den>
+                                          <m:r>
+                                            <a:rPr lang="en-US" b="0" i="1" smtClean="0">
+                                              <a:latin typeface="Cambria Math" panose="02040503050406030204" pitchFamily="18" charset="0"/>
+                                              <a:ea typeface="Cambria Math" panose="02040503050406030204" pitchFamily="18" charset="0"/>
+                                            </a:rPr>
+                                            <m:t>2</m:t>
+                                          </m:r>
+                                        </m:den>
+                                      </m:f>
+                                    </m:sup>
+                                  </m:sSup>
+                                  <m:sSup>
+                                    <m:sSupPr>
+                                      <m:ctrlPr>
+                                        <a:rPr lang="en-US" i="1" smtClean="0">
+                                          <a:latin typeface="Cambria Math" panose="02040503050406030204" pitchFamily="18" charset="0"/>
+                                          <a:ea typeface="Cambria Math" panose="02040503050406030204" pitchFamily="18" charset="0"/>
+                                        </a:rPr>
+                                      </m:ctrlPr>
+                                    </m:sSupPr>
+                                    <m:e>
+                                      <m:r>
+                                        <a:rPr lang="en-US" i="1" smtClean="0">
+                                          <a:latin typeface="Cambria Math" panose="02040503050406030204" pitchFamily="18" charset="0"/>
+                                          <a:ea typeface="Cambria Math" panose="02040503050406030204" pitchFamily="18" charset="0"/>
+                                        </a:rPr>
+                                        <m:t>𝜑</m:t>
+                                      </m:r>
+                                    </m:e>
+                                    <m:sup>
+                                      <m:r>
+                                        <a:rPr lang="en-US" b="0" i="1" smtClean="0">
+                                          <a:latin typeface="Cambria Math" panose="02040503050406030204" pitchFamily="18" charset="0"/>
+                                          <a:ea typeface="Cambria Math" panose="02040503050406030204" pitchFamily="18" charset="0"/>
+                                        </a:rPr>
+                                        <m:t>𝑚</m:t>
+                                      </m:r>
+                                    </m:sup>
+                                  </m:sSup>
+                                </m:num>
+                                <m:den>
+                                  <m:r>
+                                    <a:rPr lang="en-US" b="0" i="1" smtClean="0">
+                                      <a:latin typeface="Cambria Math" panose="02040503050406030204" pitchFamily="18" charset="0"/>
+                                      <a:ea typeface="Cambria Math" panose="02040503050406030204" pitchFamily="18" charset="0"/>
+                                    </a:rPr>
+                                    <m:t>𝑚</m:t>
+                                  </m:r>
+                                  <m:r>
+                                    <a:rPr lang="en-US" b="0" i="1" smtClean="0">
+                                      <a:latin typeface="Cambria Math" panose="02040503050406030204" pitchFamily="18" charset="0"/>
+                                      <a:ea typeface="Cambria Math" panose="02040503050406030204" pitchFamily="18" charset="0"/>
+                                    </a:rPr>
+                                    <m:t>!</m:t>
+                                  </m:r>
+                                  <m:sSup>
+                                    <m:sSupPr>
+                                      <m:ctrlPr>
+                                        <a:rPr lang="en-US" b="0" i="1" smtClean="0">
+                                          <a:latin typeface="Cambria Math" panose="02040503050406030204" pitchFamily="18" charset="0"/>
+                                          <a:ea typeface="Cambria Math" panose="02040503050406030204" pitchFamily="18" charset="0"/>
+                                        </a:rPr>
+                                      </m:ctrlPr>
+                                    </m:sSupPr>
+                                    <m:e>
+                                      <m:r>
+                                        <a:rPr lang="en-US" i="1">
+                                          <a:latin typeface="Cambria Math" panose="02040503050406030204" pitchFamily="18" charset="0"/>
+                                          <a:ea typeface="Cambria Math" panose="02040503050406030204" pitchFamily="18" charset="0"/>
+                                        </a:rPr>
+                                        <m:t>(2</m:t>
+                                      </m:r>
+                                      <m:r>
+                                        <a:rPr lang="en-US" i="1">
+                                          <a:latin typeface="Cambria Math" panose="02040503050406030204" pitchFamily="18" charset="0"/>
+                                          <a:ea typeface="Cambria Math" panose="02040503050406030204" pitchFamily="18" charset="0"/>
+                                        </a:rPr>
+                                        <m:t>𝜋</m:t>
+                                      </m:r>
+                                      <m:r>
+                                        <a:rPr lang="en-US" i="1">
+                                          <a:latin typeface="Cambria Math" panose="02040503050406030204" pitchFamily="18" charset="0"/>
+                                          <a:ea typeface="Cambria Math" panose="02040503050406030204" pitchFamily="18" charset="0"/>
+                                        </a:rPr>
+                                        <m:t>)</m:t>
+                                      </m:r>
+                                    </m:e>
+                                    <m:sup>
+                                      <m:r>
+                                        <a:rPr lang="en-US" b="0" i="1" smtClean="0">
+                                          <a:latin typeface="Cambria Math" panose="02040503050406030204" pitchFamily="18" charset="0"/>
+                                          <a:ea typeface="Cambria Math" panose="02040503050406030204" pitchFamily="18" charset="0"/>
+                                        </a:rPr>
+                                        <m:t>𝑚</m:t>
+                                      </m:r>
+                                    </m:sup>
+                                  </m:sSup>
+                                </m:den>
+                              </m:f>
+                              <m:sSubSup>
+                                <m:sSubSupPr>
+                                  <m:ctrlPr>
+                                    <a:rPr lang="en-US" i="1" smtClean="0">
+                                      <a:latin typeface="Cambria Math" panose="02040503050406030204" pitchFamily="18" charset="0"/>
+                                      <a:ea typeface="Cambria Math" panose="02040503050406030204" pitchFamily="18" charset="0"/>
+                                    </a:rPr>
+                                  </m:ctrlPr>
+                                </m:sSubSupPr>
+                                <m:e>
+                                  <m:r>
+                                    <a:rPr lang="en-US" b="0" i="1" smtClean="0">
+                                      <a:latin typeface="Cambria Math" panose="02040503050406030204" pitchFamily="18" charset="0"/>
+                                      <a:ea typeface="Cambria Math" panose="02040503050406030204" pitchFamily="18" charset="0"/>
+                                    </a:rPr>
+                                    <m:t>𝐸</m:t>
+                                  </m:r>
+                                </m:e>
+                                <m:sub>
+                                  <m:r>
+                                    <a:rPr lang="en-US" b="0" i="1" smtClean="0">
+                                      <a:latin typeface="Cambria Math" panose="02040503050406030204" pitchFamily="18" charset="0"/>
+                                      <a:ea typeface="Cambria Math" panose="02040503050406030204" pitchFamily="18" charset="0"/>
+                                    </a:rPr>
+                                    <m:t>𝑖</m:t>
+                                  </m:r>
+                                </m:sub>
+                                <m:sup>
+                                  <m:r>
+                                    <a:rPr lang="en-US" b="0" i="1" smtClean="0">
+                                      <a:latin typeface="Cambria Math" panose="02040503050406030204" pitchFamily="18" charset="0"/>
+                                      <a:ea typeface="Cambria Math" panose="02040503050406030204" pitchFamily="18" charset="0"/>
+                                    </a:rPr>
+                                    <m:t>(</m:t>
+                                  </m:r>
+                                  <m:r>
+                                    <a:rPr lang="en-US" b="0" i="1" smtClean="0">
+                                      <a:latin typeface="Cambria Math" panose="02040503050406030204" pitchFamily="18" charset="0"/>
+                                      <a:ea typeface="Cambria Math" panose="02040503050406030204" pitchFamily="18" charset="0"/>
+                                    </a:rPr>
+                                    <m:t>𝑚</m:t>
+                                  </m:r>
+                                  <m:r>
+                                    <a:rPr lang="en-US" b="0" i="1" smtClean="0">
+                                      <a:latin typeface="Cambria Math" panose="02040503050406030204" pitchFamily="18" charset="0"/>
+                                      <a:ea typeface="Cambria Math" panose="02040503050406030204" pitchFamily="18" charset="0"/>
+                                    </a:rPr>
+                                    <m:t>)</m:t>
+                                  </m:r>
+                                </m:sup>
+                              </m:sSubSup>
+                              <m:r>
+                                <a:rPr lang="en-US" b="0" i="1" smtClean="0">
+                                  <a:latin typeface="Cambria Math" panose="02040503050406030204" pitchFamily="18" charset="0"/>
+                                  <a:ea typeface="Cambria Math" panose="02040503050406030204" pitchFamily="18" charset="0"/>
+                                </a:rPr>
+                                <m:t>[</m:t>
+                              </m:r>
+                              <m:r>
+                                <a:rPr lang="en-US" b="0" i="1" smtClean="0">
+                                  <a:latin typeface="Cambria Math" panose="02040503050406030204" pitchFamily="18" charset="0"/>
+                                  <a:ea typeface="Cambria Math" panose="02040503050406030204" pitchFamily="18" charset="0"/>
+                                </a:rPr>
+                                <m:t>𝑥</m:t>
+                              </m:r>
+                              <m:r>
+                                <a:rPr lang="en-US" b="0" i="1" smtClean="0">
+                                  <a:latin typeface="Cambria Math" panose="02040503050406030204" pitchFamily="18" charset="0"/>
+                                  <a:ea typeface="Cambria Math" panose="02040503050406030204" pitchFamily="18" charset="0"/>
+                                </a:rPr>
+                                <m:t>]</m:t>
+                              </m:r>
+                            </m:e>
+                          </m:nary>
+                        </m:num>
+                        <m:den>
+                          <m:sSub>
+                            <m:sSubPr>
+                              <m:ctrlPr>
+                                <a:rPr lang="en-US" i="1">
+                                  <a:latin typeface="Cambria Math" panose="02040503050406030204" pitchFamily="18" charset="0"/>
+                                </a:rPr>
+                              </m:ctrlPr>
+                            </m:sSubPr>
+                            <m:e>
+                              <m:r>
+                                <a:rPr lang="en-US" i="1">
+                                  <a:latin typeface="Cambria Math" panose="02040503050406030204" pitchFamily="18" charset="0"/>
+                                </a:rPr>
+                                <m:t>𝐸</m:t>
+                              </m:r>
+                            </m:e>
+                            <m:sub>
+                              <m:r>
+                                <a:rPr lang="en-US" i="1">
+                                  <a:latin typeface="Cambria Math" panose="02040503050406030204" pitchFamily="18" charset="0"/>
+                                </a:rPr>
+                                <m:t>𝑖</m:t>
+                              </m:r>
+                            </m:sub>
+                          </m:sSub>
+                          <m:r>
+                            <a:rPr lang="en-US" i="1">
+                              <a:latin typeface="Cambria Math" panose="02040503050406030204" pitchFamily="18" charset="0"/>
+                            </a:rPr>
+                            <m:t>[</m:t>
+                          </m:r>
+                          <m:r>
+                            <a:rPr lang="en-US" i="1">
+                              <a:latin typeface="Cambria Math" panose="02040503050406030204" pitchFamily="18" charset="0"/>
+                            </a:rPr>
+                            <m:t>𝑥</m:t>
+                          </m:r>
+                          <m:r>
+                            <a:rPr lang="en-US" i="1">
+                              <a:latin typeface="Cambria Math" panose="02040503050406030204" pitchFamily="18" charset="0"/>
+                            </a:rPr>
+                            <m:t>]</m:t>
+                          </m:r>
+                        </m:den>
+                      </m:f>
+                    </m:oMath>
+                  </m:oMathPara>
+                </a14:m>
+                <a:endParaRPr lang="en-US" dirty="0"/>
+              </a:p>
+            </p:txBody>
+          </p:sp>
+        </mc:Choice>
+        <mc:Fallback>
+          <p:sp>
+            <p:nvSpPr>
+              <p:cNvPr id="7" name="TextBox 6"/>
+              <p:cNvSpPr txBox="1">
+                <a:spLocks noRot="1" noChangeAspect="1" noMove="1" noResize="1" noEditPoints="1" noAdjustHandles="1" noChangeArrowheads="1" noChangeShapeType="1" noTextEdit="1"/>
+              </p:cNvSpPr>
+              <p:nvPr/>
+            </p:nvSpPr>
+            <p:spPr>
+              <a:xfrm>
+                <a:off x="5029200" y="1143000"/>
+                <a:ext cx="3962401" cy="861390"/>
+              </a:xfrm>
+              <a:prstGeom prst="rect">
+                <a:avLst/>
+              </a:prstGeom>
+              <a:blipFill>
+                <a:blip r:embed="rId3"/>
+                <a:stretch>
+                  <a:fillRect/>
+                </a:stretch>
+              </a:blipFill>
+            </p:spPr>
+            <p:txBody>
+              <a:bodyPr/>
+              <a:lstStyle/>
+              <a:p>
+                <a:r>
+                  <a:rPr lang="en-US">
+                    <a:noFill/>
+                  </a:rPr>
+                  <a:t> </a:t>
+                </a:r>
+              </a:p>
+            </p:txBody>
+          </p:sp>
+        </mc:Fallback>
+      </mc:AlternateContent>
     </p:spTree>
+    <p:extLst>
+      <p:ext uri="{BB962C8B-B14F-4D97-AF65-F5344CB8AC3E}">
+        <p14:creationId xmlns:p14="http://schemas.microsoft.com/office/powerpoint/2010/main" val="4195383577"/>
+      </p:ext>
+    </p:extLst>
   </p:cSld>
   <p:clrMapOvr>
     <a:masterClrMapping/>
@@ -5830,46 +6623,8 @@
         </p:nvSpPr>
         <p:spPr>
           <a:xfrm>
-            <a:off x="457200" y="274638"/>
-            <a:ext cx="8229600" cy="487362"/>
-          </a:xfrm>
-        </p:spPr>
-        <p:txBody>
-          <a:bodyPr>
-            <a:normAutofit fontScale="90000"/>
-          </a:bodyPr>
-          <a:lstStyle/>
-          <a:p>
-            <a:r>
-              <a:rPr lang="en-US" sz="3200" dirty="0" smtClean="0"/>
-              <a:t>Effect of PST on </a:t>
-            </a:r>
-            <a:r>
-              <a:rPr lang="en-US" sz="3200" dirty="0" smtClean="0"/>
-              <a:t>O</a:t>
-            </a:r>
-            <a:r>
-              <a:rPr lang="en-US" sz="3200" dirty="0" smtClean="0"/>
-              <a:t>riginal Image</a:t>
-            </a:r>
-            <a:endParaRPr lang="en-US" sz="3200" dirty="0"/>
-          </a:p>
-        </p:txBody>
-      </p:sp>
-      <p:sp>
-        <p:nvSpPr>
-          <p:cNvPr id="3" name="Content Placeholder 2"/>
-          <p:cNvSpPr>
-            <a:spLocks noGrp="1"/>
-          </p:cNvSpPr>
-          <p:nvPr>
-            <p:ph idx="1"/>
-          </p:nvPr>
-        </p:nvSpPr>
-        <p:spPr>
-          <a:xfrm>
-            <a:off x="457200" y="990600"/>
-            <a:ext cx="8229600" cy="5135563"/>
+            <a:off x="304800" y="304800"/>
+            <a:ext cx="8229600" cy="715962"/>
           </a:xfrm>
         </p:spPr>
         <p:txBody>
@@ -5879,96 +6634,63 @@
           <a:lstStyle/>
           <a:p>
             <a:r>
-              <a:rPr lang="en-US" sz="2000" dirty="0" smtClean="0"/>
-              <a:t>Below is a single frame of the data set</a:t>
-            </a:r>
-            <a:endParaRPr lang="en-US" sz="2000" dirty="0"/>
-          </a:p>
-          <a:p>
-            <a:r>
-              <a:rPr lang="en-US" sz="2000" dirty="0" smtClean="0"/>
-              <a:t>To improve the image post PST, we up the contrast of the original image before passing it through the PST</a:t>
-            </a:r>
-          </a:p>
-        </p:txBody>
-      </p:sp>
-      <p:sp>
-        <p:nvSpPr>
-          <p:cNvPr id="5" name="Rectangle 4"/>
-          <p:cNvSpPr/>
-          <p:nvPr/>
+              <a:rPr lang="en-US" sz="3200" dirty="0" smtClean="0"/>
+              <a:t>Extending the Algorithm to 3D</a:t>
+            </a:r>
+            <a:endParaRPr lang="en-US" sz="3200" dirty="0"/>
+          </a:p>
+        </p:txBody>
+      </p:sp>
+      <p:sp>
+        <p:nvSpPr>
+          <p:cNvPr id="3" name="Content Placeholder 2"/>
+          <p:cNvSpPr>
+            <a:spLocks noGrp="1"/>
+          </p:cNvSpPr>
+          <p:nvPr>
+            <p:ph idx="1"/>
+          </p:nvPr>
         </p:nvSpPr>
         <p:spPr>
           <a:xfrm>
-            <a:off x="152400" y="6324600"/>
-            <a:ext cx="8839200" cy="369332"/>
+            <a:off x="457200" y="1020762"/>
+            <a:ext cx="8229600" cy="5059363"/>
           </a:xfrm>
-          <a:prstGeom prst="rect">
-            <a:avLst/>
-          </a:prstGeom>
         </p:spPr>
         <p:txBody>
-          <a:bodyPr wrap="square">
-            <a:spAutoFit/>
+          <a:bodyPr>
+            <a:normAutofit/>
           </a:bodyPr>
           <a:lstStyle/>
           <a:p>
-            <a:endParaRPr lang="en-US" dirty="0" smtClean="0">
+            <a:r>
+              <a:rPr lang="en-US" sz="2000" dirty="0" smtClean="0">
+                <a:solidFill>
+                  <a:srgbClr val="FF0000"/>
+                </a:solidFill>
+              </a:rPr>
+              <a:t>Add and describe code changes here</a:t>
+            </a:r>
+            <a:endParaRPr lang="en-US" sz="2400" dirty="0">
               <a:solidFill>
                 <a:srgbClr val="FF0000"/>
               </a:solidFill>
             </a:endParaRPr>
           </a:p>
-        </p:txBody>
-      </p:sp>
-      <p:pic>
-        <p:nvPicPr>
-          <p:cNvPr id="4" name="Picture 3"/>
-          <p:cNvPicPr>
-            <a:picLocks noChangeAspect="1"/>
-          </p:cNvPicPr>
-          <p:nvPr/>
-        </p:nvPicPr>
-        <p:blipFill>
-          <a:blip r:embed="rId3"/>
-          <a:stretch>
-            <a:fillRect/>
-          </a:stretch>
-        </p:blipFill>
-        <p:spPr>
-          <a:xfrm>
-            <a:off x="76200" y="2209800"/>
-            <a:ext cx="4620690" cy="3916363"/>
-          </a:xfrm>
-          <a:prstGeom prst="rect">
-            <a:avLst/>
-          </a:prstGeom>
-        </p:spPr>
-      </p:pic>
-      <p:pic>
-        <p:nvPicPr>
-          <p:cNvPr id="6" name="Picture 5"/>
-          <p:cNvPicPr>
-            <a:picLocks noChangeAspect="1"/>
-          </p:cNvPicPr>
-          <p:nvPr/>
-        </p:nvPicPr>
-        <p:blipFill>
-          <a:blip r:embed="rId4"/>
-          <a:stretch>
-            <a:fillRect/>
-          </a:stretch>
-        </p:blipFill>
-        <p:spPr>
-          <a:xfrm>
-            <a:off x="4495800" y="2209800"/>
-            <a:ext cx="4359898" cy="3810001"/>
-          </a:xfrm>
-          <a:prstGeom prst="rect">
-            <a:avLst/>
-          </a:prstGeom>
-        </p:spPr>
-      </p:pic>
+          <a:p>
+            <a:endParaRPr lang="en-US" sz="2000" dirty="0" smtClean="0"/>
+          </a:p>
+          <a:p>
+            <a:endParaRPr lang="en-US" sz="2200" dirty="0" smtClean="0"/>
+          </a:p>
+          <a:p>
+            <a:endParaRPr lang="en-US" sz="2000" dirty="0" smtClean="0"/>
+          </a:p>
+          <a:p>
+            <a:endParaRPr lang="en-US" sz="2000" dirty="0"/>
+          </a:p>
+        </p:txBody>
+      </p:sp>
     </p:spTree>
   </p:cSld>
   <p:clrMapOvr>

</xml_diff>